<commit_message>
M0078DDG-448 Fix .pptx and .png for hil4
</commit_message>
<xml_diff>
--- a/PlatformDeveloperGuide/images/hil4.pptx
+++ b/PlatformDeveloperGuide/images/hil4.pptx
@@ -272,7 +272,7 @@
           <a:p>
             <a:fld id="{CD63B9D5-DAC7-4B08-8CEE-404A79EB8B50}" type="datetimeFigureOut">
               <a:rPr lang="en-GB" smtClean="0"/>
-              <a:t>07/04/2020</a:t>
+              <a:t>03/11/2021</a:t>
             </a:fld>
             <a:endParaRPr lang="en-GB"/>
           </a:p>
@@ -472,7 +472,7 @@
           <a:p>
             <a:fld id="{CD63B9D5-DAC7-4B08-8CEE-404A79EB8B50}" type="datetimeFigureOut">
               <a:rPr lang="en-GB" smtClean="0"/>
-              <a:t>07/04/2020</a:t>
+              <a:t>03/11/2021</a:t>
             </a:fld>
             <a:endParaRPr lang="en-GB"/>
           </a:p>
@@ -682,7 +682,7 @@
           <a:p>
             <a:fld id="{CD63B9D5-DAC7-4B08-8CEE-404A79EB8B50}" type="datetimeFigureOut">
               <a:rPr lang="en-GB" smtClean="0"/>
-              <a:t>07/04/2020</a:t>
+              <a:t>03/11/2021</a:t>
             </a:fld>
             <a:endParaRPr lang="en-GB"/>
           </a:p>
@@ -882,7 +882,7 @@
           <a:p>
             <a:fld id="{CD63B9D5-DAC7-4B08-8CEE-404A79EB8B50}" type="datetimeFigureOut">
               <a:rPr lang="en-GB" smtClean="0"/>
-              <a:t>07/04/2020</a:t>
+              <a:t>03/11/2021</a:t>
             </a:fld>
             <a:endParaRPr lang="en-GB"/>
           </a:p>
@@ -1158,7 +1158,7 @@
           <a:p>
             <a:fld id="{CD63B9D5-DAC7-4B08-8CEE-404A79EB8B50}" type="datetimeFigureOut">
               <a:rPr lang="en-GB" smtClean="0"/>
-              <a:t>07/04/2020</a:t>
+              <a:t>03/11/2021</a:t>
             </a:fld>
             <a:endParaRPr lang="en-GB"/>
           </a:p>
@@ -1426,7 +1426,7 @@
           <a:p>
             <a:fld id="{CD63B9D5-DAC7-4B08-8CEE-404A79EB8B50}" type="datetimeFigureOut">
               <a:rPr lang="en-GB" smtClean="0"/>
-              <a:t>07/04/2020</a:t>
+              <a:t>03/11/2021</a:t>
             </a:fld>
             <a:endParaRPr lang="en-GB"/>
           </a:p>
@@ -1841,7 +1841,7 @@
           <a:p>
             <a:fld id="{CD63B9D5-DAC7-4B08-8CEE-404A79EB8B50}" type="datetimeFigureOut">
               <a:rPr lang="en-GB" smtClean="0"/>
-              <a:t>07/04/2020</a:t>
+              <a:t>03/11/2021</a:t>
             </a:fld>
             <a:endParaRPr lang="en-GB"/>
           </a:p>
@@ -1983,7 +1983,7 @@
           <a:p>
             <a:fld id="{CD63B9D5-DAC7-4B08-8CEE-404A79EB8B50}" type="datetimeFigureOut">
               <a:rPr lang="en-GB" smtClean="0"/>
-              <a:t>07/04/2020</a:t>
+              <a:t>03/11/2021</a:t>
             </a:fld>
             <a:endParaRPr lang="en-GB"/>
           </a:p>
@@ -2096,7 +2096,7 @@
           <a:p>
             <a:fld id="{CD63B9D5-DAC7-4B08-8CEE-404A79EB8B50}" type="datetimeFigureOut">
               <a:rPr lang="en-GB" smtClean="0"/>
-              <a:t>07/04/2020</a:t>
+              <a:t>03/11/2021</a:t>
             </a:fld>
             <a:endParaRPr lang="en-GB"/>
           </a:p>
@@ -2409,7 +2409,7 @@
           <a:p>
             <a:fld id="{CD63B9D5-DAC7-4B08-8CEE-404A79EB8B50}" type="datetimeFigureOut">
               <a:rPr lang="en-GB" smtClean="0"/>
-              <a:t>07/04/2020</a:t>
+              <a:t>03/11/2021</a:t>
             </a:fld>
             <a:endParaRPr lang="en-GB"/>
           </a:p>
@@ -2698,7 +2698,7 @@
           <a:p>
             <a:fld id="{CD63B9D5-DAC7-4B08-8CEE-404A79EB8B50}" type="datetimeFigureOut">
               <a:rPr lang="en-GB" smtClean="0"/>
-              <a:t>07/04/2020</a:t>
+              <a:t>03/11/2021</a:t>
             </a:fld>
             <a:endParaRPr lang="en-GB"/>
           </a:p>
@@ -2941,7 +2941,7 @@
           <a:p>
             <a:fld id="{CD63B9D5-DAC7-4B08-8CEE-404A79EB8B50}" type="datetimeFigureOut">
               <a:rPr lang="en-GB" smtClean="0"/>
-              <a:t>07/04/2020</a:t>
+              <a:t>03/11/2021</a:t>
             </a:fld>
             <a:endParaRPr lang="en-GB"/>
           </a:p>
@@ -3615,7 +3615,7 @@
               <a:defRPr/>
             </a:pPr>
             <a:r>
-              <a:rPr kumimoji="0" lang="en-US" sz="1400" b="1" i="0" u="none" strike="noStrike" kern="0" cap="none" spc="0" normalizeH="0" baseline="0" noProof="0" dirty="0" err="1">
+              <a:rPr kumimoji="0" lang="en-US" sz="1400" b="1" i="0" u="none" strike="noStrike" kern="0" cap="none" spc="0" normalizeH="0" baseline="0" noProof="0" dirty="0">
                 <a:ln>
                   <a:noFill/>
                 </a:ln>
@@ -3629,22 +3629,8 @@
                 <a:ea typeface="Source Sans Pro Light" charset="0"/>
                 <a:cs typeface="Source Sans Pro Light" charset="0"/>
               </a:rPr>
-              <a:t>SimJPF</a:t>
-            </a:r>
-            <a:endParaRPr kumimoji="0" lang="en-US" sz="1400" b="1" i="0" u="none" strike="noStrike" kern="0" cap="none" spc="0" normalizeH="0" baseline="0" noProof="0" dirty="0">
-              <a:ln>
-                <a:noFill/>
-              </a:ln>
-              <a:solidFill>
-                <a:srgbClr val="4B5357"/>
-              </a:solidFill>
-              <a:effectLst/>
-              <a:uLnTx/>
-              <a:uFillTx/>
-              <a:latin typeface="Source Sans Pro Light" charset="0"/>
-              <a:ea typeface="Source Sans Pro Light" charset="0"/>
-              <a:cs typeface="Source Sans Pro Light" charset="0"/>
-            </a:endParaRPr>
+              <a:t>MicroEJ Simulator</a:t>
+            </a:r>
           </a:p>
         </p:txBody>
       </p:sp>
@@ -3759,23 +3745,6 @@
               <a:defRPr/>
             </a:pPr>
             <a:r>
-              <a:rPr kumimoji="0" lang="en-US" sz="1000" b="0" u="none" strike="noStrike" kern="0" cap="none" spc="0" normalizeH="0" baseline="0" noProof="0" dirty="0" err="1">
-                <a:ln>
-                  <a:noFill/>
-                </a:ln>
-                <a:solidFill>
-                  <a:srgbClr val="4B5357"/>
-                </a:solidFill>
-                <a:effectLst/>
-                <a:uLnTx/>
-                <a:uFillTx/>
-                <a:latin typeface="Source Sans Pro Light" charset="0"/>
-                <a:ea typeface="Source Sans Pro Light" charset="0"/>
-                <a:cs typeface="Source Sans Pro Light" charset="0"/>
-              </a:rPr>
-              <a:t>NativeInterface.refreshContent</a:t>
-            </a:r>
-            <a:r>
               <a:rPr kumimoji="0" lang="en-US" sz="1000" b="0" u="none" strike="noStrike" kern="0" cap="none" spc="0" normalizeH="0" baseline="0" noProof="0" dirty="0">
                 <a:ln>
                   <a:noFill/>
@@ -3790,7 +3759,7 @@
                 <a:ea typeface="Source Sans Pro Light" charset="0"/>
                 <a:cs typeface="Source Sans Pro Light" charset="0"/>
               </a:rPr>
-              <a:t>()</a:t>
+              <a:t>NativeInterface.refreshContent()</a:t>
             </a:r>
           </a:p>
         </p:txBody>
@@ -4200,7 +4169,9 @@
               </a:ext>
             </a:extLst>
           </p:cNvPr>
-          <p:cNvCxnSpPr/>
+          <p:cNvCxnSpPr>
+            <a:cxnSpLocks/>
+          </p:cNvCxnSpPr>
           <p:nvPr/>
         </p:nvCxnSpPr>
         <p:spPr>
@@ -4232,7 +4203,9 @@
               </a:ext>
             </a:extLst>
           </p:cNvPr>
-          <p:cNvCxnSpPr/>
+          <p:cNvCxnSpPr>
+            <a:cxnSpLocks/>
+          </p:cNvCxnSpPr>
           <p:nvPr/>
         </p:nvCxnSpPr>
         <p:spPr>
@@ -4337,7 +4310,9 @@
               </a:ext>
             </a:extLst>
           </p:cNvPr>
-          <p:cNvCxnSpPr/>
+          <p:cNvCxnSpPr>
+            <a:cxnSpLocks/>
+          </p:cNvCxnSpPr>
           <p:nvPr/>
         </p:nvCxnSpPr>
         <p:spPr>
@@ -4369,7 +4344,9 @@
               </a:ext>
             </a:extLst>
           </p:cNvPr>
-          <p:cNvCxnSpPr/>
+          <p:cNvCxnSpPr>
+            <a:cxnSpLocks/>
+          </p:cNvCxnSpPr>
           <p:nvPr/>
         </p:nvCxnSpPr>
         <p:spPr>
@@ -4401,7 +4378,9 @@
               </a:ext>
             </a:extLst>
           </p:cNvPr>
-          <p:cNvCxnSpPr/>
+          <p:cNvCxnSpPr>
+            <a:cxnSpLocks/>
+          </p:cNvCxnSpPr>
           <p:nvPr/>
         </p:nvCxnSpPr>
         <p:spPr>
@@ -4470,23 +4449,6 @@
               <a:defRPr/>
             </a:pPr>
             <a:r>
-              <a:rPr kumimoji="0" lang="en-US" sz="1000" b="0" u="none" strike="noStrike" kern="0" cap="none" spc="0" normalizeH="0" baseline="0" noProof="0" dirty="0" err="1">
-                <a:ln>
-                  <a:noFill/>
-                </a:ln>
-                <a:solidFill>
-                  <a:srgbClr val="4B5357"/>
-                </a:solidFill>
-                <a:effectLst/>
-                <a:uLnTx/>
-                <a:uFillTx/>
-                <a:latin typeface="Source Sans Pro Light" charset="0"/>
-                <a:ea typeface="Source Sans Pro Light" charset="0"/>
-                <a:cs typeface="Source Sans Pro Light" charset="0"/>
-              </a:rPr>
-              <a:t>NativeInterface.flushContent</a:t>
-            </a:r>
-            <a:r>
               <a:rPr kumimoji="0" lang="en-US" sz="1000" b="0" u="none" strike="noStrike" kern="0" cap="none" spc="0" normalizeH="0" baseline="0" noProof="0" dirty="0">
                 <a:ln>
                   <a:noFill/>
@@ -4501,7 +4463,7 @@
                 <a:ea typeface="Source Sans Pro Light" charset="0"/>
                 <a:cs typeface="Source Sans Pro Light" charset="0"/>
               </a:rPr>
-              <a:t>()</a:t>
+              <a:t>NativeInterface.flushContent()</a:t>
             </a:r>
           </a:p>
         </p:txBody>

</xml_diff>